<commit_message>
text for the multiple choice question
</commit_message>
<xml_diff>
--- a/exampleCourse/questions/gallery/multipleChoice/prepareImages.pptx
+++ b/exampleCourse/questions/gallery/multipleChoice/prepareImages.pptx
@@ -7,6 +7,7 @@
   <p:sldIdLst>
     <p:sldId id="257" r:id="rId2"/>
     <p:sldId id="258" r:id="rId3"/>
+    <p:sldId id="259" r:id="rId4"/>
   </p:sldIdLst>
   <p:sldSz cx="12192000" cy="6858000"/>
   <p:notesSz cx="6858000" cy="9144000"/>
@@ -4978,6 +4979,456 @@
 </p:sld>
 </file>
 
+<file path=ppt/slides/slide3.xml><?xml version="1.0" encoding="utf-8"?>
+<p:sld xmlns:a="http://schemas.openxmlformats.org/drawingml/2006/main" xmlns:r="http://schemas.openxmlformats.org/officeDocument/2006/relationships" xmlns:p="http://schemas.openxmlformats.org/presentationml/2006/main">
+  <p:cSld>
+    <p:spTree>
+      <p:nvGrpSpPr>
+        <p:cNvPr id="1" name=""/>
+        <p:cNvGrpSpPr/>
+        <p:nvPr/>
+      </p:nvGrpSpPr>
+      <p:grpSpPr>
+        <a:xfrm>
+          <a:off x="0" y="0"/>
+          <a:ext cx="0" cy="0"/>
+          <a:chOff x="0" y="0"/>
+          <a:chExt cx="0" cy="0"/>
+        </a:xfrm>
+      </p:grpSpPr>
+      <p:pic>
+        <p:nvPicPr>
+          <p:cNvPr id="5" name="Picture 4">
+            <a:extLst>
+              <a:ext uri="{FF2B5EF4-FFF2-40B4-BE49-F238E27FC236}">
+                <a16:creationId xmlns:a16="http://schemas.microsoft.com/office/drawing/2014/main" id="{4B8883D8-6369-7841-ABD8-BC40B6A1A147}"/>
+              </a:ext>
+            </a:extLst>
+          </p:cNvPr>
+          <p:cNvPicPr>
+            <a:picLocks noChangeAspect="1"/>
+          </p:cNvPicPr>
+          <p:nvPr/>
+        </p:nvPicPr>
+        <p:blipFill>
+          <a:blip r:embed="rId2"/>
+          <a:stretch>
+            <a:fillRect/>
+          </a:stretch>
+        </p:blipFill>
+        <p:spPr>
+          <a:xfrm>
+            <a:off x="2605391" y="28281"/>
+            <a:ext cx="7150904" cy="6858000"/>
+          </a:xfrm>
+          <a:prstGeom prst="rect">
+            <a:avLst/>
+          </a:prstGeom>
+        </p:spPr>
+      </p:pic>
+      <p:sp>
+        <p:nvSpPr>
+          <p:cNvPr id="39" name="Oval 38">
+            <a:extLst>
+              <a:ext uri="{FF2B5EF4-FFF2-40B4-BE49-F238E27FC236}">
+                <a16:creationId xmlns:a16="http://schemas.microsoft.com/office/drawing/2014/main" id="{98ECA145-8E78-EC46-8FBC-1C9C2B3FA9DF}"/>
+              </a:ext>
+            </a:extLst>
+          </p:cNvPr>
+          <p:cNvSpPr/>
+          <p:nvPr/>
+        </p:nvSpPr>
+        <p:spPr>
+          <a:xfrm>
+            <a:off x="2951807" y="819348"/>
+            <a:ext cx="437480" cy="311872"/>
+          </a:xfrm>
+          <a:prstGeom prst="ellipse">
+            <a:avLst/>
+          </a:prstGeom>
+          <a:solidFill>
+            <a:srgbClr val="7030A0">
+              <a:alpha val="20000"/>
+            </a:srgbClr>
+          </a:solidFill>
+          <a:ln>
+            <a:solidFill>
+              <a:srgbClr val="7030A0"/>
+            </a:solidFill>
+          </a:ln>
+        </p:spPr>
+        <p:style>
+          <a:lnRef idx="2">
+            <a:schemeClr val="accent1">
+              <a:shade val="50000"/>
+            </a:schemeClr>
+          </a:lnRef>
+          <a:fillRef idx="1">
+            <a:schemeClr val="accent1"/>
+          </a:fillRef>
+          <a:effectRef idx="0">
+            <a:schemeClr val="accent1"/>
+          </a:effectRef>
+          <a:fontRef idx="minor">
+            <a:schemeClr val="lt1"/>
+          </a:fontRef>
+        </p:style>
+        <p:txBody>
+          <a:bodyPr rtlCol="0" anchor="ctr"/>
+          <a:lstStyle/>
+          <a:p>
+            <a:pPr algn="ctr"/>
+            <a:endParaRPr lang="en-US"/>
+          </a:p>
+        </p:txBody>
+      </p:sp>
+      <p:sp>
+        <p:nvSpPr>
+          <p:cNvPr id="40" name="Oval 39">
+            <a:extLst>
+              <a:ext uri="{FF2B5EF4-FFF2-40B4-BE49-F238E27FC236}">
+                <a16:creationId xmlns:a16="http://schemas.microsoft.com/office/drawing/2014/main" id="{F62A0876-7823-0B49-828A-30BB91494DFF}"/>
+              </a:ext>
+            </a:extLst>
+          </p:cNvPr>
+          <p:cNvSpPr/>
+          <p:nvPr/>
+        </p:nvSpPr>
+        <p:spPr>
+          <a:xfrm>
+            <a:off x="4631435" y="616276"/>
+            <a:ext cx="437480" cy="311872"/>
+          </a:xfrm>
+          <a:prstGeom prst="ellipse">
+            <a:avLst/>
+          </a:prstGeom>
+          <a:solidFill>
+            <a:srgbClr val="7030A0">
+              <a:alpha val="20000"/>
+            </a:srgbClr>
+          </a:solidFill>
+          <a:ln>
+            <a:solidFill>
+              <a:srgbClr val="7030A0"/>
+            </a:solidFill>
+          </a:ln>
+        </p:spPr>
+        <p:style>
+          <a:lnRef idx="2">
+            <a:schemeClr val="accent1">
+              <a:shade val="50000"/>
+            </a:schemeClr>
+          </a:lnRef>
+          <a:fillRef idx="1">
+            <a:schemeClr val="accent1"/>
+          </a:fillRef>
+          <a:effectRef idx="0">
+            <a:schemeClr val="accent1"/>
+          </a:effectRef>
+          <a:fontRef idx="minor">
+            <a:schemeClr val="lt1"/>
+          </a:fontRef>
+        </p:style>
+        <p:txBody>
+          <a:bodyPr rtlCol="0" anchor="ctr"/>
+          <a:lstStyle/>
+          <a:p>
+            <a:pPr algn="ctr"/>
+            <a:endParaRPr lang="en-US"/>
+          </a:p>
+        </p:txBody>
+      </p:sp>
+      <p:sp>
+        <p:nvSpPr>
+          <p:cNvPr id="41" name="Oval 40">
+            <a:extLst>
+              <a:ext uri="{FF2B5EF4-FFF2-40B4-BE49-F238E27FC236}">
+                <a16:creationId xmlns:a16="http://schemas.microsoft.com/office/drawing/2014/main" id="{C2FC69B1-AB3B-544C-B6BD-C8503366B432}"/>
+              </a:ext>
+            </a:extLst>
+          </p:cNvPr>
+          <p:cNvSpPr/>
+          <p:nvPr/>
+        </p:nvSpPr>
+        <p:spPr>
+          <a:xfrm>
+            <a:off x="7967518" y="560864"/>
+            <a:ext cx="629727" cy="367284"/>
+          </a:xfrm>
+          <a:prstGeom prst="ellipse">
+            <a:avLst/>
+          </a:prstGeom>
+          <a:solidFill>
+            <a:srgbClr val="7030A0">
+              <a:alpha val="20000"/>
+            </a:srgbClr>
+          </a:solidFill>
+          <a:ln>
+            <a:solidFill>
+              <a:srgbClr val="7030A0"/>
+            </a:solidFill>
+          </a:ln>
+        </p:spPr>
+        <p:style>
+          <a:lnRef idx="2">
+            <a:schemeClr val="accent1">
+              <a:shade val="50000"/>
+            </a:schemeClr>
+          </a:lnRef>
+          <a:fillRef idx="1">
+            <a:schemeClr val="accent1"/>
+          </a:fillRef>
+          <a:effectRef idx="0">
+            <a:schemeClr val="accent1"/>
+          </a:effectRef>
+          <a:fontRef idx="minor">
+            <a:schemeClr val="lt1"/>
+          </a:fontRef>
+        </p:style>
+        <p:txBody>
+          <a:bodyPr rtlCol="0" anchor="ctr"/>
+          <a:lstStyle/>
+          <a:p>
+            <a:pPr algn="ctr"/>
+            <a:endParaRPr lang="en-US"/>
+          </a:p>
+        </p:txBody>
+      </p:sp>
+      <p:sp>
+        <p:nvSpPr>
+          <p:cNvPr id="42" name="Oval 41">
+            <a:extLst>
+              <a:ext uri="{FF2B5EF4-FFF2-40B4-BE49-F238E27FC236}">
+                <a16:creationId xmlns:a16="http://schemas.microsoft.com/office/drawing/2014/main" id="{72408202-4F1D-B946-A5C4-11A30B63C860}"/>
+              </a:ext>
+            </a:extLst>
+          </p:cNvPr>
+          <p:cNvSpPr/>
+          <p:nvPr/>
+        </p:nvSpPr>
+        <p:spPr>
+          <a:xfrm>
+            <a:off x="6908106" y="819348"/>
+            <a:ext cx="562433" cy="367284"/>
+          </a:xfrm>
+          <a:prstGeom prst="ellipse">
+            <a:avLst/>
+          </a:prstGeom>
+          <a:solidFill>
+            <a:srgbClr val="7030A0">
+              <a:alpha val="20000"/>
+            </a:srgbClr>
+          </a:solidFill>
+          <a:ln>
+            <a:solidFill>
+              <a:srgbClr val="7030A0"/>
+            </a:solidFill>
+          </a:ln>
+        </p:spPr>
+        <p:style>
+          <a:lnRef idx="2">
+            <a:schemeClr val="accent1">
+              <a:shade val="50000"/>
+            </a:schemeClr>
+          </a:lnRef>
+          <a:fillRef idx="1">
+            <a:schemeClr val="accent1"/>
+          </a:fillRef>
+          <a:effectRef idx="0">
+            <a:schemeClr val="accent1"/>
+          </a:effectRef>
+          <a:fontRef idx="minor">
+            <a:schemeClr val="lt1"/>
+          </a:fontRef>
+        </p:style>
+        <p:txBody>
+          <a:bodyPr rtlCol="0" anchor="ctr"/>
+          <a:lstStyle/>
+          <a:p>
+            <a:pPr algn="ctr"/>
+            <a:endParaRPr lang="en-US"/>
+          </a:p>
+        </p:txBody>
+      </p:sp>
+      <p:sp>
+        <p:nvSpPr>
+          <p:cNvPr id="62" name="Rounded Rectangle 61">
+            <a:extLst>
+              <a:ext uri="{FF2B5EF4-FFF2-40B4-BE49-F238E27FC236}">
+                <a16:creationId xmlns:a16="http://schemas.microsoft.com/office/drawing/2014/main" id="{994BAB6A-84F0-2B49-B4FA-7A87509CC448}"/>
+              </a:ext>
+            </a:extLst>
+          </p:cNvPr>
+          <p:cNvSpPr/>
+          <p:nvPr/>
+        </p:nvSpPr>
+        <p:spPr>
+          <a:xfrm>
+            <a:off x="2724346" y="4095694"/>
+            <a:ext cx="6820293" cy="523221"/>
+          </a:xfrm>
+          <a:prstGeom prst="roundRect">
+            <a:avLst/>
+          </a:prstGeom>
+          <a:solidFill>
+            <a:srgbClr val="7030A0">
+              <a:alpha val="20000"/>
+            </a:srgbClr>
+          </a:solidFill>
+          <a:ln>
+            <a:solidFill>
+              <a:srgbClr val="7030A0"/>
+            </a:solidFill>
+          </a:ln>
+        </p:spPr>
+        <p:style>
+          <a:lnRef idx="2">
+            <a:schemeClr val="accent1">
+              <a:shade val="50000"/>
+            </a:schemeClr>
+          </a:lnRef>
+          <a:fillRef idx="1">
+            <a:schemeClr val="accent1"/>
+          </a:fillRef>
+          <a:effectRef idx="0">
+            <a:schemeClr val="accent1"/>
+          </a:effectRef>
+          <a:fontRef idx="minor">
+            <a:schemeClr val="lt1"/>
+          </a:fontRef>
+        </p:style>
+        <p:txBody>
+          <a:bodyPr rtlCol="0" anchor="ctr"/>
+          <a:lstStyle/>
+          <a:p>
+            <a:pPr algn="ctr"/>
+            <a:endParaRPr lang="en-US"/>
+          </a:p>
+        </p:txBody>
+      </p:sp>
+      <p:sp>
+        <p:nvSpPr>
+          <p:cNvPr id="19" name="Rounded Rectangle 18">
+            <a:extLst>
+              <a:ext uri="{FF2B5EF4-FFF2-40B4-BE49-F238E27FC236}">
+                <a16:creationId xmlns:a16="http://schemas.microsoft.com/office/drawing/2014/main" id="{90C00CD0-AF64-4A45-A2E2-A761BC0FFADB}"/>
+              </a:ext>
+            </a:extLst>
+          </p:cNvPr>
+          <p:cNvSpPr/>
+          <p:nvPr/>
+        </p:nvSpPr>
+        <p:spPr>
+          <a:xfrm>
+            <a:off x="2876747" y="4691742"/>
+            <a:ext cx="1325139" cy="1426029"/>
+          </a:xfrm>
+          <a:prstGeom prst="roundRect">
+            <a:avLst/>
+          </a:prstGeom>
+          <a:solidFill>
+            <a:srgbClr val="7030A0">
+              <a:alpha val="20000"/>
+            </a:srgbClr>
+          </a:solidFill>
+          <a:ln>
+            <a:solidFill>
+              <a:srgbClr val="7030A0"/>
+            </a:solidFill>
+          </a:ln>
+        </p:spPr>
+        <p:style>
+          <a:lnRef idx="2">
+            <a:schemeClr val="accent1">
+              <a:shade val="50000"/>
+            </a:schemeClr>
+          </a:lnRef>
+          <a:fillRef idx="1">
+            <a:schemeClr val="accent1"/>
+          </a:fillRef>
+          <a:effectRef idx="0">
+            <a:schemeClr val="accent1"/>
+          </a:effectRef>
+          <a:fontRef idx="minor">
+            <a:schemeClr val="lt1"/>
+          </a:fontRef>
+        </p:style>
+        <p:txBody>
+          <a:bodyPr rtlCol="0" anchor="ctr"/>
+          <a:lstStyle/>
+          <a:p>
+            <a:pPr algn="ctr"/>
+            <a:endParaRPr lang="en-US"/>
+          </a:p>
+        </p:txBody>
+      </p:sp>
+      <p:sp>
+        <p:nvSpPr>
+          <p:cNvPr id="3" name="Rounded Rectangle 2">
+            <a:extLst>
+              <a:ext uri="{FF2B5EF4-FFF2-40B4-BE49-F238E27FC236}">
+                <a16:creationId xmlns:a16="http://schemas.microsoft.com/office/drawing/2014/main" id="{92015818-1897-AB42-8274-145C44999468}"/>
+              </a:ext>
+            </a:extLst>
+          </p:cNvPr>
+          <p:cNvSpPr/>
+          <p:nvPr/>
+        </p:nvSpPr>
+        <p:spPr>
+          <a:xfrm>
+            <a:off x="2724346" y="1394460"/>
+            <a:ext cx="2784914" cy="2668682"/>
+          </a:xfrm>
+          <a:prstGeom prst="roundRect">
+            <a:avLst>
+              <a:gd name="adj" fmla="val 5128"/>
+            </a:avLst>
+          </a:prstGeom>
+          <a:noFill/>
+          <a:ln w="25400">
+            <a:solidFill>
+              <a:srgbClr val="7030A0"/>
+            </a:solidFill>
+          </a:ln>
+        </p:spPr>
+        <p:style>
+          <a:lnRef idx="2">
+            <a:schemeClr val="accent1">
+              <a:shade val="50000"/>
+            </a:schemeClr>
+          </a:lnRef>
+          <a:fillRef idx="1">
+            <a:schemeClr val="accent1"/>
+          </a:fillRef>
+          <a:effectRef idx="0">
+            <a:schemeClr val="accent1"/>
+          </a:effectRef>
+          <a:fontRef idx="minor">
+            <a:schemeClr val="lt1"/>
+          </a:fontRef>
+        </p:style>
+        <p:txBody>
+          <a:bodyPr rtlCol="0" anchor="ctr"/>
+          <a:lstStyle/>
+          <a:p>
+            <a:pPr algn="ctr"/>
+            <a:endParaRPr lang="en-US"/>
+          </a:p>
+        </p:txBody>
+      </p:sp>
+    </p:spTree>
+    <p:extLst>
+      <p:ext uri="{BB962C8B-B14F-4D97-AF65-F5344CB8AC3E}">
+        <p14:creationId xmlns:p14="http://schemas.microsoft.com/office/powerpoint/2010/main" val="2540376231"/>
+      </p:ext>
+    </p:extLst>
+  </p:cSld>
+  <p:clrMapOvr>
+    <a:masterClrMapping/>
+  </p:clrMapOvr>
+</p:sld>
+</file>
+
 <file path=ppt/theme/theme1.xml><?xml version="1.0" encoding="utf-8"?>
 <a:theme xmlns:a="http://schemas.openxmlformats.org/drawingml/2006/main" name="Office Theme">
   <a:themeElements>

</xml_diff>